<commit_message>
Added the scope for the background color
</commit_message>
<xml_diff>
--- a/Understanding_Kubernetes/Kubernetes.pptx
+++ b/Understanding_Kubernetes/Kubernetes.pptx
@@ -5,7 +5,7 @@
     <p:sldMasterId id="2147483648" r:id="rId1"/>
   </p:sldMasterIdLst>
   <p:notesMasterIdLst>
-    <p:notesMasterId r:id="rId11"/>
+    <p:notesMasterId r:id="rId10"/>
   </p:notesMasterIdLst>
   <p:sldIdLst>
     <p:sldId id="259" r:id="rId2"/>
@@ -14,9 +14,8 @@
     <p:sldId id="269" r:id="rId5"/>
     <p:sldId id="267" r:id="rId6"/>
     <p:sldId id="273" r:id="rId7"/>
-    <p:sldId id="272" r:id="rId8"/>
-    <p:sldId id="270" r:id="rId9"/>
-    <p:sldId id="268" r:id="rId10"/>
+    <p:sldId id="270" r:id="rId8"/>
+    <p:sldId id="268" r:id="rId9"/>
   </p:sldIdLst>
   <p:sldSz cx="12192000" cy="6858000"/>
   <p:notesSz cx="6858000" cy="9144000"/>
@@ -895,7 +894,7 @@
           <a:p>
             <a:fld id="{48CDD979-1E21-459F-A323-FC7A349FE621}" type="slidenum">
               <a:rPr lang="en-US" smtClean="0"/>
-              <a:t>9</a:t>
+              <a:t>8</a:t>
             </a:fld>
             <a:endParaRPr lang="en-US" dirty="0"/>
           </a:p>
@@ -5030,7 +5029,7 @@
             </a:pPr>
             <a:r>
               <a:rPr lang="en-US" dirty="0"/>
-              <a:t>QA Session</a:t>
+              <a:t>Summary and QA</a:t>
             </a:r>
           </a:p>
           <a:p>
@@ -5356,8 +5355,8 @@
         </p:nvSpPr>
         <p:spPr>
           <a:xfrm>
-            <a:off x="0" y="2659559"/>
-            <a:ext cx="12192000" cy="769441"/>
+            <a:off x="1002324" y="1428333"/>
+            <a:ext cx="10045211" cy="3970318"/>
           </a:xfrm>
           <a:prstGeom prst="rect">
             <a:avLst/>
@@ -5369,10 +5368,73 @@
           </a:bodyPr>
           <a:lstStyle/>
           <a:p>
-            <a:pPr algn="ctr"/>
-            <a:r>
-              <a:rPr lang="en-US" sz="4400" dirty="0"/>
-              <a:t>Pods, Deployments, Services, Config Map</a:t>
+            <a:pPr marL="571500" indent="-571500">
+              <a:buFont typeface="Arial" panose="020B0604020202020204" pitchFamily="34" charset="0"/>
+              <a:buChar char="•"/>
+            </a:pPr>
+            <a:r>
+              <a:rPr lang="en-US" sz="3600" dirty="0"/>
+              <a:t>Pods</a:t>
+            </a:r>
+          </a:p>
+          <a:p>
+            <a:pPr marL="571500" indent="-571500">
+              <a:buFont typeface="Arial" panose="020B0604020202020204" pitchFamily="34" charset="0"/>
+              <a:buChar char="•"/>
+            </a:pPr>
+            <a:r>
+              <a:rPr lang="en-US" sz="3600" dirty="0"/>
+              <a:t>Deployments and Replica set</a:t>
+            </a:r>
+          </a:p>
+          <a:p>
+            <a:pPr marL="571500" indent="-571500">
+              <a:buFont typeface="Arial" panose="020B0604020202020204" pitchFamily="34" charset="0"/>
+              <a:buChar char="•"/>
+            </a:pPr>
+            <a:r>
+              <a:rPr lang="en-US" sz="3600" dirty="0"/>
+              <a:t>Services</a:t>
+            </a:r>
+          </a:p>
+          <a:p>
+            <a:pPr marL="1028700" lvl="1" indent="-571500">
+              <a:buFont typeface="Arial" panose="020B0604020202020204" pitchFamily="34" charset="0"/>
+              <a:buChar char="•"/>
+            </a:pPr>
+            <a:r>
+              <a:rPr lang="en-US" sz="3600" dirty="0"/>
+              <a:t>Liveliness and readiness probe</a:t>
+            </a:r>
+          </a:p>
+          <a:p>
+            <a:pPr marL="1028700" lvl="1" indent="-571500">
+              <a:buFont typeface="Arial" panose="020B0604020202020204" pitchFamily="34" charset="0"/>
+              <a:buChar char="•"/>
+            </a:pPr>
+            <a:r>
+              <a:rPr lang="en-US" sz="3600" dirty="0"/>
+              <a:t>Load balancing</a:t>
+            </a:r>
+          </a:p>
+          <a:p>
+            <a:pPr marL="571500" indent="-571500">
+              <a:buFont typeface="Arial" panose="020B0604020202020204" pitchFamily="34" charset="0"/>
+              <a:buChar char="•"/>
+            </a:pPr>
+            <a:r>
+              <a:rPr lang="en-US" sz="3600" dirty="0"/>
+              <a:t>Config Map and secrets</a:t>
+            </a:r>
+          </a:p>
+          <a:p>
+            <a:pPr marL="571500" indent="-571500">
+              <a:buFont typeface="Arial" panose="020B0604020202020204" pitchFamily="34" charset="0"/>
+              <a:buChar char="•"/>
+            </a:pPr>
+            <a:r>
+              <a:rPr lang="en-US" sz="3600" dirty="0"/>
+              <a:t>Auto scaling and self healing</a:t>
             </a:r>
           </a:p>
         </p:txBody>
@@ -5407,10 +5469,150 @@
           <a:chExt cx="0" cy="0"/>
         </a:xfrm>
       </p:grpSpPr>
+      <p:sp>
+        <p:nvSpPr>
+          <p:cNvPr id="2" name="Title 1">
+            <a:extLst>
+              <a:ext uri="{FF2B5EF4-FFF2-40B4-BE49-F238E27FC236}">
+                <a16:creationId xmlns:a16="http://schemas.microsoft.com/office/drawing/2014/main" id="{AE6FC849-36EB-4DEA-848F-12EC945EA22C}"/>
+              </a:ext>
+            </a:extLst>
+          </p:cNvPr>
+          <p:cNvSpPr>
+            <a:spLocks noGrp="1"/>
+          </p:cNvSpPr>
+          <p:nvPr>
+            <p:ph type="title"/>
+          </p:nvPr>
+        </p:nvSpPr>
+        <p:spPr/>
+        <p:txBody>
+          <a:bodyPr/>
+          <a:lstStyle/>
+          <a:p>
+            <a:r>
+              <a:rPr lang="en-US" dirty="0"/>
+              <a:t>References</a:t>
+            </a:r>
+          </a:p>
+        </p:txBody>
+      </p:sp>
+      <p:sp>
+        <p:nvSpPr>
+          <p:cNvPr id="3" name="Content Placeholder 2">
+            <a:extLst>
+              <a:ext uri="{FF2B5EF4-FFF2-40B4-BE49-F238E27FC236}">
+                <a16:creationId xmlns:a16="http://schemas.microsoft.com/office/drawing/2014/main" id="{BA81FB4F-A096-468A-9BE8-77D404D4D3E9}"/>
+              </a:ext>
+            </a:extLst>
+          </p:cNvPr>
+          <p:cNvSpPr>
+            <a:spLocks noGrp="1"/>
+          </p:cNvSpPr>
+          <p:nvPr>
+            <p:ph idx="1"/>
+          </p:nvPr>
+        </p:nvSpPr>
+        <p:spPr/>
+        <p:txBody>
+          <a:bodyPr>
+            <a:normAutofit fontScale="92500" lnSpcReduction="20000"/>
+          </a:bodyPr>
+          <a:lstStyle/>
+          <a:p>
+            <a:r>
+              <a:rPr lang="en-US" b="1" dirty="0"/>
+              <a:t>Kubernetes</a:t>
+            </a:r>
+            <a:br>
+              <a:rPr lang="en-US" b="1" dirty="0"/>
+            </a:br>
+            <a:br>
+              <a:rPr lang="en-US" dirty="0"/>
+            </a:br>
+            <a:r>
+              <a:rPr lang="en-US" dirty="0">
+                <a:hlinkClick r:id="rId2"/>
+              </a:rPr>
+              <a:t>https://kubernetes.io/docs/concepts/overview/what-is-kubernetes/</a:t>
+            </a:r>
+            <a:br>
+              <a:rPr lang="en-US" dirty="0"/>
+            </a:br>
+            <a:br>
+              <a:rPr lang="en-US" dirty="0"/>
+            </a:br>
+            <a:r>
+              <a:rPr lang="en-US" dirty="0">
+                <a:hlinkClick r:id="rId3"/>
+              </a:rPr>
+              <a:t>https://kubernetes.io/docs/concepts/overview/</a:t>
+            </a:r>
+            <a:br>
+              <a:rPr lang="en-US" dirty="0"/>
+            </a:br>
+            <a:br>
+              <a:rPr lang="en-US" dirty="0"/>
+            </a:br>
+            <a:br>
+              <a:rPr lang="en-US" dirty="0"/>
+            </a:br>
+            <a:r>
+              <a:rPr lang="en-US" b="1" dirty="0"/>
+              <a:t>Docker Hub</a:t>
+            </a:r>
+          </a:p>
+          <a:p>
+            <a:r>
+              <a:rPr lang="en-US" dirty="0">
+                <a:hlinkClick r:id="rId4"/>
+              </a:rPr>
+              <a:t>https://hub.docker.com/</a:t>
+            </a:r>
+            <a:br>
+              <a:rPr lang="en-US" dirty="0"/>
+            </a:br>
+            <a:br>
+              <a:rPr lang="en-US" dirty="0"/>
+            </a:br>
+            <a:br>
+              <a:rPr lang="en-US" dirty="0"/>
+            </a:br>
+            <a:r>
+              <a:rPr lang="en-US" b="1" dirty="0"/>
+              <a:t>Plural Sight course</a:t>
+            </a:r>
+          </a:p>
+          <a:p>
+            <a:r>
+              <a:rPr lang="en-US" dirty="0">
+                <a:hlinkClick r:id="rId5"/>
+              </a:rPr>
+              <a:t>https://app.pluralsight.com/library/courses/kubernetes-getting-started/table-of-contents</a:t>
+            </a:r>
+            <a:r>
+              <a:rPr lang="en-US" dirty="0"/>
+              <a:t> </a:t>
+            </a:r>
+          </a:p>
+          <a:p>
+            <a:r>
+              <a:rPr lang="en-US" dirty="0">
+                <a:hlinkClick r:id="rId6"/>
+              </a:rPr>
+              <a:t>https://app.pluralsight.com/library/courses/docker-kubernetes-big-picture/table-of-contents</a:t>
+            </a:r>
+            <a:br>
+              <a:rPr lang="en-US" dirty="0"/>
+            </a:br>
+            <a:endParaRPr lang="en-US" dirty="0"/>
+          </a:p>
+        </p:txBody>
+      </p:sp>
     </p:spTree>
     <p:extLst>
       <p:ext uri="{BB962C8B-B14F-4D97-AF65-F5344CB8AC3E}">
-        <p14:creationId xmlns:p14="http://schemas.microsoft.com/office/powerpoint/2010/main" val="1632099406"/>
+        <p14:creationId xmlns:p14="http://schemas.microsoft.com/office/powerpoint/2010/main" val="4132265241"/>
       </p:ext>
     </p:extLst>
   </p:cSld>
@@ -5439,193 +5641,6 @@
       </p:grpSpPr>
       <p:sp>
         <p:nvSpPr>
-          <p:cNvPr id="2" name="Title 1">
-            <a:extLst>
-              <a:ext uri="{FF2B5EF4-FFF2-40B4-BE49-F238E27FC236}">
-                <a16:creationId xmlns:a16="http://schemas.microsoft.com/office/drawing/2014/main" id="{AE6FC849-36EB-4DEA-848F-12EC945EA22C}"/>
-              </a:ext>
-            </a:extLst>
-          </p:cNvPr>
-          <p:cNvSpPr>
-            <a:spLocks noGrp="1"/>
-          </p:cNvSpPr>
-          <p:nvPr>
-            <p:ph type="title"/>
-          </p:nvPr>
-        </p:nvSpPr>
-        <p:spPr/>
-        <p:txBody>
-          <a:bodyPr/>
-          <a:lstStyle/>
-          <a:p>
-            <a:r>
-              <a:rPr lang="en-US" dirty="0"/>
-              <a:t>Important URL and references</a:t>
-            </a:r>
-          </a:p>
-        </p:txBody>
-      </p:sp>
-      <p:sp>
-        <p:nvSpPr>
-          <p:cNvPr id="3" name="Content Placeholder 2">
-            <a:extLst>
-              <a:ext uri="{FF2B5EF4-FFF2-40B4-BE49-F238E27FC236}">
-                <a16:creationId xmlns:a16="http://schemas.microsoft.com/office/drawing/2014/main" id="{BA81FB4F-A096-468A-9BE8-77D404D4D3E9}"/>
-              </a:ext>
-            </a:extLst>
-          </p:cNvPr>
-          <p:cNvSpPr>
-            <a:spLocks noGrp="1"/>
-          </p:cNvSpPr>
-          <p:nvPr>
-            <p:ph idx="1"/>
-          </p:nvPr>
-        </p:nvSpPr>
-        <p:spPr/>
-        <p:txBody>
-          <a:bodyPr>
-            <a:normAutofit fontScale="85000" lnSpcReduction="20000"/>
-          </a:bodyPr>
-          <a:lstStyle/>
-          <a:p>
-            <a:r>
-              <a:rPr lang="en-US" dirty="0"/>
-              <a:t>Plural Sight course</a:t>
-            </a:r>
-          </a:p>
-          <a:p>
-            <a:r>
-              <a:rPr lang="en-US" dirty="0">
-                <a:hlinkClick r:id="rId2"/>
-              </a:rPr>
-              <a:t>https://app.pluralsight.com/library/courses/kubernetes-getting-started/table-of-contents</a:t>
-            </a:r>
-            <a:r>
-              <a:rPr lang="en-US" dirty="0"/>
-              <a:t> </a:t>
-            </a:r>
-          </a:p>
-          <a:p>
-            <a:r>
-              <a:rPr lang="en-US" dirty="0">
-                <a:hlinkClick r:id="rId3"/>
-              </a:rPr>
-              <a:t>https://app.pluralsight.com/library/courses/docker-kubernetes-big-picture/table-of-contents</a:t>
-            </a:r>
-            <a:r>
-              <a:rPr lang="en-US" dirty="0"/>
-              <a:t> </a:t>
-            </a:r>
-            <a:br>
-              <a:rPr lang="en-US" dirty="0"/>
-            </a:br>
-            <a:endParaRPr lang="en-US" dirty="0"/>
-          </a:p>
-          <a:p>
-            <a:r>
-              <a:rPr lang="en-US" dirty="0"/>
-              <a:t>Kubernetes Manifest ( Declarative )</a:t>
-            </a:r>
-            <a:br>
-              <a:rPr lang="en-US" dirty="0"/>
-            </a:br>
-            <a:br>
-              <a:rPr lang="en-US" dirty="0"/>
-            </a:br>
-            <a:r>
-              <a:rPr lang="en-US" dirty="0">
-                <a:hlinkClick r:id="rId4"/>
-              </a:rPr>
-              <a:t>https://kubernetes.io/docs/concepts/overview/what-is-kubernetes/</a:t>
-            </a:r>
-            <a:br>
-              <a:rPr lang="en-US" dirty="0"/>
-            </a:br>
-            <a:br>
-              <a:rPr lang="en-US" dirty="0"/>
-            </a:br>
-            <a:r>
-              <a:rPr lang="en-US" dirty="0">
-                <a:hlinkClick r:id="rId5"/>
-              </a:rPr>
-              <a:t>https://kubernetes.io/docs/concepts/overview/</a:t>
-            </a:r>
-            <a:br>
-              <a:rPr lang="en-US" dirty="0"/>
-            </a:br>
-            <a:br>
-              <a:rPr lang="en-US" dirty="0"/>
-            </a:br>
-            <a:r>
-              <a:rPr lang="en-US" dirty="0"/>
-              <a:t>Docker Hub</a:t>
-            </a:r>
-          </a:p>
-          <a:p>
-            <a:r>
-              <a:rPr lang="en-US" dirty="0">
-                <a:hlinkClick r:id="rId6"/>
-              </a:rPr>
-              <a:t>https://hub.docker.com/</a:t>
-            </a:r>
-            <a:br>
-              <a:rPr lang="en-US" dirty="0"/>
-            </a:br>
-            <a:br>
-              <a:rPr lang="en-US" dirty="0"/>
-            </a:br>
-            <a:r>
-              <a:rPr lang="en-US" dirty="0"/>
-              <a:t>Github</a:t>
-            </a:r>
-            <a:br>
-              <a:rPr lang="en-US" dirty="0"/>
-            </a:br>
-            <a:br>
-              <a:rPr lang="en-US" dirty="0"/>
-            </a:br>
-            <a:r>
-              <a:rPr lang="en-US" dirty="0">
-                <a:hlinkClick r:id="rId7"/>
-              </a:rPr>
-              <a:t>https://github.com/talktoamitdhir/kube</a:t>
-            </a:r>
-            <a:endParaRPr lang="en-US" dirty="0"/>
-          </a:p>
-        </p:txBody>
-      </p:sp>
-    </p:spTree>
-    <p:extLst>
-      <p:ext uri="{BB962C8B-B14F-4D97-AF65-F5344CB8AC3E}">
-        <p14:creationId xmlns:p14="http://schemas.microsoft.com/office/powerpoint/2010/main" val="4132265241"/>
-      </p:ext>
-    </p:extLst>
-  </p:cSld>
-  <p:clrMapOvr>
-    <a:masterClrMapping/>
-  </p:clrMapOvr>
-</p:sld>
-</file>
-
-<file path=ppt/slides/slide9.xml><?xml version="1.0" encoding="utf-8"?>
-<p:sld xmlns:a="http://schemas.openxmlformats.org/drawingml/2006/main" xmlns:r="http://schemas.openxmlformats.org/officeDocument/2006/relationships" xmlns:p="http://schemas.openxmlformats.org/presentationml/2006/main">
-  <p:cSld>
-    <p:spTree>
-      <p:nvGrpSpPr>
-        <p:cNvPr id="1" name=""/>
-        <p:cNvGrpSpPr/>
-        <p:nvPr/>
-      </p:nvGrpSpPr>
-      <p:grpSpPr>
-        <a:xfrm>
-          <a:off x="0" y="0"/>
-          <a:ext cx="0" cy="0"/>
-          <a:chOff x="0" y="0"/>
-          <a:chExt cx="0" cy="0"/>
-        </a:xfrm>
-      </p:grpSpPr>
-      <p:sp>
-        <p:nvSpPr>
           <p:cNvPr id="4" name="Rectangle 3">
             <a:extLst>
               <a:ext uri="{FF2B5EF4-FFF2-40B4-BE49-F238E27FC236}">
@@ -5638,8 +5653,8 @@
         </p:nvSpPr>
         <p:spPr>
           <a:xfrm>
-            <a:off x="4090520" y="3044279"/>
-            <a:ext cx="4010960" cy="769441"/>
+            <a:off x="1022839" y="2455194"/>
+            <a:ext cx="10146322" cy="830997"/>
           </a:xfrm>
           <a:prstGeom prst="rect">
             <a:avLst/>
@@ -5652,9 +5667,83 @@
           <a:lstStyle/>
           <a:p>
             <a:r>
-              <a:rPr lang="en-US" sz="4400" dirty="0"/>
-              <a:t>QUESTIONS???</a:t>
-            </a:r>
+              <a:rPr lang="en-US" sz="4800" dirty="0">
+                <a:hlinkClick r:id="rId3"/>
+              </a:rPr>
+              <a:t>https://github.com/talktoamitdhir/kube</a:t>
+            </a:r>
+            <a:endParaRPr lang="en-US" sz="4400" dirty="0"/>
+          </a:p>
+        </p:txBody>
+      </p:sp>
+      <p:sp>
+        <p:nvSpPr>
+          <p:cNvPr id="5" name="TextBox 4">
+            <a:extLst>
+              <a:ext uri="{FF2B5EF4-FFF2-40B4-BE49-F238E27FC236}">
+                <a16:creationId xmlns:a16="http://schemas.microsoft.com/office/drawing/2014/main" id="{096F787E-2FCA-4A7E-A109-1E9E3B72490C}"/>
+              </a:ext>
+            </a:extLst>
+          </p:cNvPr>
+          <p:cNvSpPr txBox="1"/>
+          <p:nvPr/>
+        </p:nvSpPr>
+        <p:spPr>
+          <a:xfrm>
+            <a:off x="5252488" y="1235293"/>
+            <a:ext cx="1687024" cy="369332"/>
+          </a:xfrm>
+          <a:prstGeom prst="rect">
+            <a:avLst/>
+          </a:prstGeom>
+          <a:noFill/>
+        </p:spPr>
+        <p:txBody>
+          <a:bodyPr wrap="square">
+            <a:spAutoFit/>
+          </a:bodyPr>
+          <a:lstStyle/>
+          <a:p>
+            <a:r>
+              <a:rPr lang="en-US" dirty="0"/>
+              <a:t>SUMMARY</a:t>
+            </a:r>
+          </a:p>
+        </p:txBody>
+      </p:sp>
+      <p:sp>
+        <p:nvSpPr>
+          <p:cNvPr id="6" name="TextBox 5">
+            <a:extLst>
+              <a:ext uri="{FF2B5EF4-FFF2-40B4-BE49-F238E27FC236}">
+                <a16:creationId xmlns:a16="http://schemas.microsoft.com/office/drawing/2014/main" id="{98261EFB-FA65-411B-8C1F-9E1E11C49D76}"/>
+              </a:ext>
+            </a:extLst>
+          </p:cNvPr>
+          <p:cNvSpPr txBox="1"/>
+          <p:nvPr/>
+        </p:nvSpPr>
+        <p:spPr>
+          <a:xfrm>
+            <a:off x="5310188" y="4412246"/>
+            <a:ext cx="1687024" cy="369332"/>
+          </a:xfrm>
+          <a:prstGeom prst="rect">
+            <a:avLst/>
+          </a:prstGeom>
+          <a:noFill/>
+        </p:spPr>
+        <p:txBody>
+          <a:bodyPr wrap="square">
+            <a:spAutoFit/>
+          </a:bodyPr>
+          <a:lstStyle/>
+          <a:p>
+            <a:r>
+              <a:rPr lang="en-US" sz="1800" dirty="0"/>
+              <a:t>QUESTIONS?</a:t>
+            </a:r>
+            <a:endParaRPr lang="en-US" dirty="0"/>
           </a:p>
         </p:txBody>
       </p:sp>

</xml_diff>

<commit_message>
Updated Presentation with more details
</commit_message>
<xml_diff>
--- a/Understanding_Kubernetes/Kubernetes.pptx
+++ b/Understanding_Kubernetes/Kubernetes.pptx
@@ -11,11 +11,11 @@
     <p:sldId id="259" r:id="rId2"/>
     <p:sldId id="263" r:id="rId3"/>
     <p:sldId id="269" r:id="rId4"/>
-    <p:sldId id="275" r:id="rId5"/>
-    <p:sldId id="274" r:id="rId6"/>
+    <p:sldId id="273" r:id="rId5"/>
+    <p:sldId id="275" r:id="rId6"/>
     <p:sldId id="276" r:id="rId7"/>
-    <p:sldId id="267" r:id="rId8"/>
-    <p:sldId id="273" r:id="rId9"/>
+    <p:sldId id="278" r:id="rId8"/>
+    <p:sldId id="267" r:id="rId9"/>
     <p:sldId id="270" r:id="rId10"/>
     <p:sldId id="268" r:id="rId11"/>
   </p:sldIdLst>
@@ -124,6 +124,41 @@
 </p:presentation>
 </file>
 
+<file path=ppt/commentAuthors.xml><?xml version="1.0" encoding="utf-8"?>
+<p:cmAuthorLst xmlns:a="http://schemas.openxmlformats.org/drawingml/2006/main" xmlns:r="http://schemas.openxmlformats.org/officeDocument/2006/relationships" xmlns:p="http://schemas.openxmlformats.org/presentationml/2006/main">
+  <p:cmAuthor id="1" name="Amit Dhir" initials="AD" lastIdx="2" clrIdx="0">
+    <p:extLst>
+      <p:ext uri="{19B8F6BF-5375-455C-9EA6-DF929625EA0E}">
+        <p15:presenceInfo xmlns:p15="http://schemas.microsoft.com/office/powerpoint/2012/main" userId="S::amit.dhir@technossus.com::23fafe30-54bc-4f9a-a52e-cd860854f3c7" providerId="AD"/>
+      </p:ext>
+    </p:extLst>
+  </p:cmAuthor>
+</p:cmAuthorLst>
+</file>
+
+<file path=ppt/comments/comment1.xml><?xml version="1.0" encoding="utf-8"?>
+<p:cmLst xmlns:a="http://schemas.openxmlformats.org/drawingml/2006/main" xmlns:r="http://schemas.openxmlformats.org/officeDocument/2006/relationships" xmlns:p="http://schemas.openxmlformats.org/presentationml/2006/main">
+  <p:cm authorId="1" dt="2021-02-21T12:40:15.372" idx="1">
+    <p:pos x="7642" y="269"/>
+    <p:text/>
+    <p:extLst>
+      <p:ext uri="{C676402C-5697-4E1C-873F-D02D1690AC5C}">
+        <p15:threadingInfo xmlns:p15="http://schemas.microsoft.com/office/powerpoint/2012/main" timeZoneBias="480"/>
+      </p:ext>
+    </p:extLst>
+  </p:cm>
+  <p:cm authorId="1" dt="2021-02-21T12:40:28.709" idx="2">
+    <p:pos x="10" y="10"/>
+    <p:text>Schedular Schedules the pod to the node</p:text>
+    <p:extLst>
+      <p:ext uri="{C676402C-5697-4E1C-873F-D02D1690AC5C}">
+        <p15:threadingInfo xmlns:p15="http://schemas.microsoft.com/office/powerpoint/2012/main" timeZoneBias="480"/>
+      </p:ext>
+    </p:extLst>
+  </p:cm>
+</p:cmLst>
+</file>
+
 <file path=ppt/notesMasters/notesMaster1.xml><?xml version="1.0" encoding="utf-8"?>
 <p:notesMaster xmlns:a="http://schemas.openxmlformats.org/drawingml/2006/main" xmlns:r="http://schemas.openxmlformats.org/officeDocument/2006/relationships" xmlns:p="http://schemas.openxmlformats.org/presentationml/2006/main">
   <p:cSld>
@@ -206,7 +241,7 @@
           <a:p>
             <a:fld id="{3D489D7F-5E0A-4AB7-9046-90C75797668D}" type="datetimeFigureOut">
               <a:rPr lang="en-US" smtClean="0"/>
-              <a:t>2/16/2021</a:t>
+              <a:t>2/22/2021</a:t>
             </a:fld>
             <a:endParaRPr lang="en-US" dirty="0"/>
           </a:p>
@@ -728,7 +763,7 @@
           <a:p>
             <a:fld id="{48CDD979-1E21-459F-A323-FC7A349FE621}" type="slidenum">
               <a:rPr lang="en-US" smtClean="0"/>
-              <a:t>7</a:t>
+              <a:t>4</a:t>
             </a:fld>
             <a:endParaRPr lang="en-US" dirty="0"/>
           </a:p>
@@ -737,7 +772,7 @@
     </p:spTree>
     <p:extLst>
       <p:ext uri="{BB962C8B-B14F-4D97-AF65-F5344CB8AC3E}">
-        <p14:creationId xmlns:p14="http://schemas.microsoft.com/office/powerpoint/2010/main" val="1011523491"/>
+        <p14:creationId xmlns:p14="http://schemas.microsoft.com/office/powerpoint/2010/main" val="3152152594"/>
       </p:ext>
     </p:extLst>
   </p:cSld>
@@ -821,7 +856,7 @@
     </p:spTree>
     <p:extLst>
       <p:ext uri="{BB962C8B-B14F-4D97-AF65-F5344CB8AC3E}">
-        <p14:creationId xmlns:p14="http://schemas.microsoft.com/office/powerpoint/2010/main" val="3152152594"/>
+        <p14:creationId xmlns:p14="http://schemas.microsoft.com/office/powerpoint/2010/main" val="1011523491"/>
       </p:ext>
     </p:extLst>
   </p:cSld>
@@ -1141,7 +1176,7 @@
           <a:p>
             <a:fld id="{4BDF68E2-58F2-4D09-BE8B-E3BD06533059}" type="datetimeFigureOut">
               <a:rPr lang="en-US" dirty="0"/>
-              <a:t>2/16/2021</a:t>
+              <a:t>2/22/2021</a:t>
             </a:fld>
             <a:endParaRPr lang="en-US" dirty="0"/>
           </a:p>
@@ -1344,7 +1379,7 @@
           <a:p>
             <a:fld id="{2E2D6473-DF6D-4702-B328-E0DD40540A4E}" type="datetimeFigureOut">
               <a:rPr lang="en-US" dirty="0"/>
-              <a:t>2/16/2021</a:t>
+              <a:t>2/22/2021</a:t>
             </a:fld>
             <a:endParaRPr lang="en-US" dirty="0"/>
           </a:p>
@@ -1595,7 +1630,7 @@
           <a:p>
             <a:fld id="{E26F7E3A-B166-407D-9866-32884E7D5B37}" type="datetimeFigureOut">
               <a:rPr lang="en-US" dirty="0"/>
-              <a:t>2/16/2021</a:t>
+              <a:t>2/22/2021</a:t>
             </a:fld>
             <a:endParaRPr lang="en-US" dirty="0"/>
           </a:p>
@@ -1863,7 +1898,7 @@
           <a:p>
             <a:fld id="{528FC5F6-F338-4AE4-BB23-26385BCFC423}" type="datetimeFigureOut">
               <a:rPr lang="en-US" dirty="0"/>
-              <a:t>2/16/2021</a:t>
+              <a:t>2/22/2021</a:t>
             </a:fld>
             <a:endParaRPr lang="en-US" dirty="0"/>
           </a:p>
@@ -2201,7 +2236,7 @@
           <a:p>
             <a:fld id="{20EBB0C4-6273-4C6E-B9BD-2EDC30F1CD52}" type="datetimeFigureOut">
               <a:rPr lang="en-US" dirty="0"/>
-              <a:t>2/16/2021</a:t>
+              <a:t>2/22/2021</a:t>
             </a:fld>
             <a:endParaRPr lang="en-US" dirty="0"/>
           </a:p>
@@ -2471,7 +2506,7 @@
           <a:p>
             <a:fld id="{19AB4D41-86C1-4908-B66A-0B50CEB3BF29}" type="datetimeFigureOut">
               <a:rPr lang="en-US" dirty="0"/>
-              <a:t>2/16/2021</a:t>
+              <a:t>2/22/2021</a:t>
             </a:fld>
             <a:endParaRPr lang="en-US" dirty="0"/>
           </a:p>
@@ -2845,7 +2880,7 @@
           <a:p>
             <a:fld id="{E6426E2C-56C1-4E0D-A793-0088A7FDD37E}" type="datetimeFigureOut">
               <a:rPr lang="en-US" dirty="0"/>
-              <a:t>2/16/2021</a:t>
+              <a:t>2/22/2021</a:t>
             </a:fld>
             <a:endParaRPr lang="en-US" dirty="0"/>
           </a:p>
@@ -2958,7 +2993,7 @@
           <a:p>
             <a:fld id="{C8C39B41-D8B5-4052-B551-9B5525EAA8B6}" type="datetimeFigureOut">
               <a:rPr lang="en-US" dirty="0"/>
-              <a:t>2/16/2021</a:t>
+              <a:t>2/22/2021</a:t>
             </a:fld>
             <a:endParaRPr lang="en-US" dirty="0"/>
           </a:p>
@@ -3124,7 +3159,7 @@
           <a:p>
             <a:fld id="{4D94136C-8742-45B2-AF27-D93DF72833A9}" type="datetimeFigureOut">
               <a:rPr lang="en-US" dirty="0"/>
-              <a:t>2/16/2021</a:t>
+              <a:t>2/22/2021</a:t>
             </a:fld>
             <a:endParaRPr lang="en-US" dirty="0"/>
           </a:p>
@@ -3474,7 +3509,7 @@
           <a:p>
             <a:fld id="{32ABBEA6-7C60-4B02-AE87-00D78D8422AF}" type="datetimeFigureOut">
               <a:rPr lang="en-US" dirty="0"/>
-              <a:t>2/16/2021</a:t>
+              <a:t>2/22/2021</a:t>
             </a:fld>
             <a:endParaRPr lang="en-US" dirty="0"/>
           </a:p>
@@ -3851,7 +3886,7 @@
           <a:p>
             <a:fld id="{C9CAD897-D46E-4AD2-BD9B-49DD3E640873}" type="datetimeFigureOut">
               <a:rPr lang="en-US" dirty="0"/>
-              <a:t>2/16/2021</a:t>
+              <a:t>2/22/2021</a:t>
             </a:fld>
             <a:endParaRPr lang="en-US" dirty="0"/>
           </a:p>
@@ -4133,7 +4168,7 @@
           <a:p>
             <a:fld id="{98624D31-43A5-475A-80CF-332C9F6DCF35}" type="datetimeFigureOut">
               <a:rPr lang="en-US" dirty="0"/>
-              <a:t>2/16/2021</a:t>
+              <a:t>2/22/2021</a:t>
             </a:fld>
             <a:endParaRPr lang="en-US" dirty="0"/>
           </a:p>
@@ -5068,7 +5103,12 @@
             <p:ph idx="1"/>
           </p:nvPr>
         </p:nvSpPr>
-        <p:spPr/>
+        <p:spPr>
+          <a:xfrm>
+            <a:off x="1097280" y="1845734"/>
+            <a:ext cx="10177524" cy="4023360"/>
+          </a:xfrm>
+        </p:spPr>
         <p:txBody>
           <a:bodyPr/>
           <a:lstStyle/>
@@ -5093,11 +5133,43 @@
             </a:r>
           </a:p>
           <a:p>
+            <a:pPr marL="726948" lvl="2" indent="-342900">
+              <a:buFont typeface="+mj-lt"/>
+              <a:buAutoNum type="arabicPeriod"/>
+            </a:pPr>
+            <a:r>
+              <a:rPr lang="en-US" b="0" i="0" dirty="0">
+                <a:solidFill>
+                  <a:srgbClr val="222222"/>
+                </a:solidFill>
+                <a:effectLst/>
+                <a:latin typeface="open sans"/>
+              </a:rPr>
+              <a:t>Terminology.</a:t>
+            </a:r>
+          </a:p>
+          <a:p>
             <a:pPr marL="544068" lvl="1" indent="-342900">
               <a:buFont typeface="+mj-lt"/>
               <a:buAutoNum type="arabicPeriod"/>
             </a:pPr>
             <a:r>
+              <a:rPr lang="en-US" dirty="0">
+                <a:solidFill>
+                  <a:srgbClr val="222222"/>
+                </a:solidFill>
+                <a:latin typeface="open sans"/>
+              </a:rPr>
+              <a:t>Why</a:t>
+            </a:r>
+            <a:endParaRPr lang="en-US" dirty="0"/>
+          </a:p>
+          <a:p>
+            <a:pPr marL="544068" lvl="1" indent="-342900">
+              <a:buFont typeface="+mj-lt"/>
+              <a:buAutoNum type="arabicPeriod"/>
+            </a:pPr>
+            <a:r>
               <a:rPr lang="en-US" dirty="0"/>
               <a:t>Walkthrough of a demo app and setting up of local environment.</a:t>
             </a:r>
@@ -5129,7 +5201,7 @@
             </a:pPr>
             <a:r>
               <a:rPr lang="en-US" dirty="0"/>
-              <a:t>Kubernetes</a:t>
+              <a:t>Hands on.</a:t>
             </a:r>
           </a:p>
           <a:p>
@@ -5148,10 +5220,9 @@
               <a:buAutoNum type="arabicPeriod"/>
             </a:pPr>
             <a:r>
-              <a:rPr lang="en-US"/>
-              <a:t>References</a:t>
-            </a:r>
-            <a:endParaRPr lang="en-US" dirty="0"/>
+              <a:rPr lang="en-US" dirty="0"/>
+              <a:t>References.</a:t>
+            </a:r>
           </a:p>
           <a:p>
             <a:pPr marL="544068" lvl="1" indent="-342900">
@@ -5160,7 +5231,7 @@
             </a:pPr>
             <a:r>
               <a:rPr lang="en-US" dirty="0"/>
-              <a:t>Summary and QA</a:t>
+              <a:t>Summary and QA.</a:t>
             </a:r>
           </a:p>
           <a:p>
@@ -5276,6 +5347,173 @@
           <a:chExt cx="0" cy="0"/>
         </a:xfrm>
       </p:grpSpPr>
+      <p:sp>
+        <p:nvSpPr>
+          <p:cNvPr id="5" name="Title 4">
+            <a:extLst>
+              <a:ext uri="{FF2B5EF4-FFF2-40B4-BE49-F238E27FC236}">
+                <a16:creationId xmlns:a16="http://schemas.microsoft.com/office/drawing/2014/main" id="{FB57601A-AC6D-4EAA-A913-514DF47E47E8}"/>
+              </a:ext>
+            </a:extLst>
+          </p:cNvPr>
+          <p:cNvSpPr>
+            <a:spLocks noGrp="1"/>
+          </p:cNvSpPr>
+          <p:nvPr>
+            <p:ph type="title"/>
+          </p:nvPr>
+        </p:nvSpPr>
+        <p:spPr/>
+        <p:txBody>
+          <a:bodyPr/>
+          <a:lstStyle/>
+          <a:p>
+            <a:r>
+              <a:rPr lang="en-US" dirty="0"/>
+              <a:t>Terminology</a:t>
+            </a:r>
+          </a:p>
+        </p:txBody>
+      </p:sp>
+      <p:sp>
+        <p:nvSpPr>
+          <p:cNvPr id="6" name="Content Placeholder 5">
+            <a:extLst>
+              <a:ext uri="{FF2B5EF4-FFF2-40B4-BE49-F238E27FC236}">
+                <a16:creationId xmlns:a16="http://schemas.microsoft.com/office/drawing/2014/main" id="{45C55121-9480-4355-BA59-6B2124228DF4}"/>
+              </a:ext>
+            </a:extLst>
+          </p:cNvPr>
+          <p:cNvSpPr>
+            <a:spLocks noGrp="1"/>
+          </p:cNvSpPr>
+          <p:nvPr>
+            <p:ph idx="1"/>
+          </p:nvPr>
+        </p:nvSpPr>
+        <p:spPr/>
+        <p:txBody>
+          <a:bodyPr>
+            <a:normAutofit fontScale="92500" lnSpcReduction="20000"/>
+          </a:bodyPr>
+          <a:lstStyle/>
+          <a:p>
+            <a:pPr marL="571500" indent="-571500">
+              <a:buFont typeface="Arial" panose="020B0604020202020204" pitchFamily="34" charset="0"/>
+              <a:buChar char="•"/>
+            </a:pPr>
+            <a:r>
+              <a:rPr lang="en-US" sz="3600" dirty="0"/>
+              <a:t>Node</a:t>
+            </a:r>
+          </a:p>
+          <a:p>
+            <a:pPr marL="1028700" lvl="1" indent="-571500">
+              <a:buFont typeface="Arial" panose="020B0604020202020204" pitchFamily="34" charset="0"/>
+              <a:buChar char="•"/>
+            </a:pPr>
+            <a:r>
+              <a:rPr lang="en-US" sz="3600" dirty="0"/>
+              <a:t>Pods</a:t>
+            </a:r>
+          </a:p>
+          <a:p>
+            <a:pPr marL="1485900" lvl="2" indent="-571500">
+              <a:buFont typeface="Arial" panose="020B0604020202020204" pitchFamily="34" charset="0"/>
+              <a:buChar char="•"/>
+            </a:pPr>
+            <a:r>
+              <a:rPr lang="en-US" sz="3600" dirty="0"/>
+              <a:t>Containers</a:t>
+            </a:r>
+          </a:p>
+          <a:p>
+            <a:pPr marL="1943100" lvl="3" indent="-571500">
+              <a:buFont typeface="Arial" panose="020B0604020202020204" pitchFamily="34" charset="0"/>
+              <a:buChar char="•"/>
+            </a:pPr>
+            <a:r>
+              <a:rPr lang="en-US" sz="3600" dirty="0"/>
+              <a:t>Liveliness and readiness probe</a:t>
+            </a:r>
+          </a:p>
+          <a:p>
+            <a:pPr marL="571500" indent="-571500">
+              <a:buFont typeface="Arial" panose="020B0604020202020204" pitchFamily="34" charset="0"/>
+              <a:buChar char="•"/>
+            </a:pPr>
+            <a:r>
+              <a:rPr lang="en-US" sz="3600" dirty="0"/>
+              <a:t>Deployments and Replica </a:t>
+            </a:r>
+            <a:r>
+              <a:rPr lang="en-US" sz="3600"/>
+              <a:t>set.</a:t>
+            </a:r>
+            <a:endParaRPr lang="en-US" sz="3600" dirty="0"/>
+          </a:p>
+          <a:p>
+            <a:pPr marL="864108" lvl="1" indent="-571500">
+              <a:buFont typeface="Arial" panose="020B0604020202020204" pitchFamily="34" charset="0"/>
+              <a:buChar char="•"/>
+            </a:pPr>
+            <a:r>
+              <a:rPr lang="en-US" sz="3600" dirty="0"/>
+              <a:t>Auto scaling and self healing.</a:t>
+            </a:r>
+          </a:p>
+          <a:p>
+            <a:pPr marL="571500" indent="-571500">
+              <a:buFont typeface="Arial" panose="020B0604020202020204" pitchFamily="34" charset="0"/>
+              <a:buChar char="•"/>
+            </a:pPr>
+            <a:r>
+              <a:rPr lang="en-US" sz="3600" dirty="0"/>
+              <a:t>Services and Load balancing</a:t>
+            </a:r>
+          </a:p>
+          <a:p>
+            <a:pPr marL="571500" indent="-571500">
+              <a:buFont typeface="Arial" panose="020B0604020202020204" pitchFamily="34" charset="0"/>
+              <a:buChar char="•"/>
+            </a:pPr>
+            <a:r>
+              <a:rPr lang="en-US" sz="3600" dirty="0"/>
+              <a:t>Config Map and secrets</a:t>
+            </a:r>
+          </a:p>
+        </p:txBody>
+      </p:sp>
+    </p:spTree>
+    <p:extLst>
+      <p:ext uri="{BB962C8B-B14F-4D97-AF65-F5344CB8AC3E}">
+        <p14:creationId xmlns:p14="http://schemas.microsoft.com/office/powerpoint/2010/main" val="359971230"/>
+      </p:ext>
+    </p:extLst>
+  </p:cSld>
+  <p:clrMapOvr>
+    <a:masterClrMapping/>
+  </p:clrMapOvr>
+</p:sld>
+</file>
+
+<file path=ppt/slides/slide5.xml><?xml version="1.0" encoding="utf-8"?>
+<p:sld xmlns:a="http://schemas.openxmlformats.org/drawingml/2006/main" xmlns:r="http://schemas.openxmlformats.org/officeDocument/2006/relationships" xmlns:p="http://schemas.openxmlformats.org/presentationml/2006/main">
+  <p:cSld>
+    <p:spTree>
+      <p:nvGrpSpPr>
+        <p:cNvPr id="1" name=""/>
+        <p:cNvGrpSpPr/>
+        <p:nvPr/>
+      </p:nvGrpSpPr>
+      <p:grpSpPr>
+        <a:xfrm>
+          <a:off x="0" y="0"/>
+          <a:ext cx="0" cy="0"/>
+          <a:chOff x="0" y="0"/>
+          <a:chExt cx="0" cy="0"/>
+        </a:xfrm>
+      </p:grpSpPr>
       <p:pic>
         <p:nvPicPr>
           <p:cNvPr id="7" name="Graphic 6">
@@ -5325,218 +5563,6 @@
 </p:sld>
 </file>
 
-<file path=ppt/slides/slide5.xml><?xml version="1.0" encoding="utf-8"?>
-<p:sld xmlns:a="http://schemas.openxmlformats.org/drawingml/2006/main" xmlns:r="http://schemas.openxmlformats.org/officeDocument/2006/relationships" xmlns:p="http://schemas.openxmlformats.org/presentationml/2006/main">
-  <p:cSld>
-    <p:spTree>
-      <p:nvGrpSpPr>
-        <p:cNvPr id="1" name=""/>
-        <p:cNvGrpSpPr/>
-        <p:nvPr/>
-      </p:nvGrpSpPr>
-      <p:grpSpPr>
-        <a:xfrm>
-          <a:off x="0" y="0"/>
-          <a:ext cx="0" cy="0"/>
-          <a:chOff x="0" y="0"/>
-          <a:chExt cx="0" cy="0"/>
-        </a:xfrm>
-      </p:grpSpPr>
-      <p:sp>
-        <p:nvSpPr>
-          <p:cNvPr id="2" name="Title 1">
-            <a:extLst>
-              <a:ext uri="{FF2B5EF4-FFF2-40B4-BE49-F238E27FC236}">
-                <a16:creationId xmlns:a16="http://schemas.microsoft.com/office/drawing/2014/main" id="{E52D3102-AE1D-4700-B349-4442F5765F07}"/>
-              </a:ext>
-            </a:extLst>
-          </p:cNvPr>
-          <p:cNvSpPr>
-            <a:spLocks noGrp="1"/>
-          </p:cNvSpPr>
-          <p:nvPr>
-            <p:ph type="title"/>
-          </p:nvPr>
-        </p:nvSpPr>
-        <p:spPr/>
-        <p:txBody>
-          <a:bodyPr/>
-          <a:lstStyle/>
-          <a:p>
-            <a:r>
-              <a:rPr lang="en-US" dirty="0"/>
-              <a:t>Benefits</a:t>
-            </a:r>
-          </a:p>
-        </p:txBody>
-      </p:sp>
-      <p:sp>
-        <p:nvSpPr>
-          <p:cNvPr id="3" name="Content Placeholder 2">
-            <a:extLst>
-              <a:ext uri="{FF2B5EF4-FFF2-40B4-BE49-F238E27FC236}">
-                <a16:creationId xmlns:a16="http://schemas.microsoft.com/office/drawing/2014/main" id="{54465C2C-1EA7-4D7D-8485-6A342633E7AF}"/>
-              </a:ext>
-            </a:extLst>
-          </p:cNvPr>
-          <p:cNvSpPr>
-            <a:spLocks noGrp="1"/>
-          </p:cNvSpPr>
-          <p:nvPr>
-            <p:ph idx="1"/>
-          </p:nvPr>
-        </p:nvSpPr>
-        <p:spPr/>
-        <p:txBody>
-          <a:bodyPr>
-            <a:normAutofit/>
-          </a:bodyPr>
-          <a:lstStyle/>
-          <a:p>
-            <a:pPr algn="l">
-              <a:buFont typeface="Arial" panose="020B0604020202020204" pitchFamily="34" charset="0"/>
-              <a:buChar char="•"/>
-            </a:pPr>
-            <a:r>
-              <a:rPr lang="en-US" b="1" i="0" dirty="0">
-                <a:solidFill>
-                  <a:srgbClr val="222222"/>
-                </a:solidFill>
-                <a:effectLst/>
-                <a:latin typeface="open sans"/>
-              </a:rPr>
-              <a:t>Service discovery and load balancing</a:t>
-            </a:r>
-            <a:r>
-              <a:rPr lang="en-US" b="0" i="0" dirty="0">
-                <a:solidFill>
-                  <a:srgbClr val="222222"/>
-                </a:solidFill>
-                <a:effectLst/>
-                <a:latin typeface="open sans"/>
-              </a:rPr>
-              <a:t> </a:t>
-            </a:r>
-          </a:p>
-          <a:p>
-            <a:pPr algn="l">
-              <a:buFont typeface="Arial" panose="020B0604020202020204" pitchFamily="34" charset="0"/>
-              <a:buChar char="•"/>
-            </a:pPr>
-            <a:r>
-              <a:rPr lang="en-US" b="1" i="0" dirty="0">
-                <a:solidFill>
-                  <a:srgbClr val="222222"/>
-                </a:solidFill>
-                <a:effectLst/>
-                <a:latin typeface="open sans"/>
-              </a:rPr>
-              <a:t>Storage orchestration </a:t>
-            </a:r>
-            <a:endParaRPr lang="en-US" b="0" i="0" dirty="0">
-              <a:solidFill>
-                <a:srgbClr val="222222"/>
-              </a:solidFill>
-              <a:effectLst/>
-              <a:latin typeface="open sans"/>
-            </a:endParaRPr>
-          </a:p>
-          <a:p>
-            <a:pPr algn="l">
-              <a:buFont typeface="Arial" panose="020B0604020202020204" pitchFamily="34" charset="0"/>
-              <a:buChar char="•"/>
-            </a:pPr>
-            <a:r>
-              <a:rPr lang="en-US" b="1" i="0" dirty="0">
-                <a:solidFill>
-                  <a:srgbClr val="222222"/>
-                </a:solidFill>
-                <a:effectLst/>
-                <a:latin typeface="open sans"/>
-              </a:rPr>
-              <a:t>Automated rollouts and rollbacks</a:t>
-            </a:r>
-            <a:r>
-              <a:rPr lang="en-US" b="0" i="0" dirty="0">
-                <a:solidFill>
-                  <a:srgbClr val="222222"/>
-                </a:solidFill>
-                <a:effectLst/>
-                <a:latin typeface="open sans"/>
-              </a:rPr>
-              <a:t> </a:t>
-            </a:r>
-          </a:p>
-          <a:p>
-            <a:pPr algn="l">
-              <a:buFont typeface="Arial" panose="020B0604020202020204" pitchFamily="34" charset="0"/>
-              <a:buChar char="•"/>
-            </a:pPr>
-            <a:r>
-              <a:rPr lang="en-US" b="1" i="0" dirty="0">
-                <a:solidFill>
-                  <a:srgbClr val="222222"/>
-                </a:solidFill>
-                <a:effectLst/>
-                <a:latin typeface="open sans"/>
-              </a:rPr>
-              <a:t>Self-healing</a:t>
-            </a:r>
-            <a:r>
-              <a:rPr lang="en-US" b="0" i="0" dirty="0">
-                <a:solidFill>
-                  <a:srgbClr val="222222"/>
-                </a:solidFill>
-                <a:effectLst/>
-                <a:latin typeface="open sans"/>
-              </a:rPr>
-              <a:t> </a:t>
-            </a:r>
-          </a:p>
-          <a:p>
-            <a:pPr algn="l">
-              <a:buFont typeface="Arial" panose="020B0604020202020204" pitchFamily="34" charset="0"/>
-              <a:buChar char="•"/>
-            </a:pPr>
-            <a:r>
-              <a:rPr lang="en-US" b="1" i="0" dirty="0">
-                <a:solidFill>
-                  <a:srgbClr val="222222"/>
-                </a:solidFill>
-                <a:effectLst/>
-                <a:latin typeface="open sans"/>
-              </a:rPr>
-              <a:t>Secret and configuration management</a:t>
-            </a:r>
-            <a:r>
-              <a:rPr lang="en-US" b="0" i="0" dirty="0">
-                <a:solidFill>
-                  <a:srgbClr val="222222"/>
-                </a:solidFill>
-                <a:effectLst/>
-                <a:latin typeface="open sans"/>
-              </a:rPr>
-              <a:t> </a:t>
-            </a:r>
-          </a:p>
-          <a:p>
-            <a:endParaRPr lang="en-US" dirty="0"/>
-          </a:p>
-        </p:txBody>
-      </p:sp>
-    </p:spTree>
-    <p:extLst>
-      <p:ext uri="{BB962C8B-B14F-4D97-AF65-F5344CB8AC3E}">
-        <p14:creationId xmlns:p14="http://schemas.microsoft.com/office/powerpoint/2010/main" val="3304991486"/>
-      </p:ext>
-    </p:extLst>
-  </p:cSld>
-  <p:clrMapOvr>
-    <a:masterClrMapping/>
-  </p:clrMapOvr>
-</p:sld>
-</file>
-
 <file path=ppt/slides/slide6.xml><?xml version="1.0" encoding="utf-8"?>
 <p:sld xmlns:a="http://schemas.openxmlformats.org/drawingml/2006/main" xmlns:r="http://schemas.openxmlformats.org/officeDocument/2006/relationships" xmlns:p="http://schemas.openxmlformats.org/presentationml/2006/main">
   <p:cSld>
@@ -5554,10 +5580,40 @@
           <a:chExt cx="0" cy="0"/>
         </a:xfrm>
       </p:grpSpPr>
+      <p:pic>
+        <p:nvPicPr>
+          <p:cNvPr id="5" name="Picture 4" descr="Diagram&#10;&#10;Description automatically generated">
+            <a:extLst>
+              <a:ext uri="{FF2B5EF4-FFF2-40B4-BE49-F238E27FC236}">
+                <a16:creationId xmlns:a16="http://schemas.microsoft.com/office/drawing/2014/main" id="{0A313722-1DB2-408C-A5A2-95E6C69022ED}"/>
+              </a:ext>
+            </a:extLst>
+          </p:cNvPr>
+          <p:cNvPicPr>
+            <a:picLocks noChangeAspect="1"/>
+          </p:cNvPicPr>
+          <p:nvPr/>
+        </p:nvPicPr>
+        <p:blipFill>
+          <a:blip r:embed="rId2"/>
+          <a:stretch>
+            <a:fillRect/>
+          </a:stretch>
+        </p:blipFill>
+        <p:spPr>
+          <a:xfrm>
+            <a:off x="347845" y="526715"/>
+            <a:ext cx="11496309" cy="5804570"/>
+          </a:xfrm>
+          <a:prstGeom prst="rect">
+            <a:avLst/>
+          </a:prstGeom>
+        </p:spPr>
+      </p:pic>
     </p:spTree>
     <p:extLst>
       <p:ext uri="{BB962C8B-B14F-4D97-AF65-F5344CB8AC3E}">
-        <p14:creationId xmlns:p14="http://schemas.microsoft.com/office/powerpoint/2010/main" val="1044699737"/>
+        <p14:creationId xmlns:p14="http://schemas.microsoft.com/office/powerpoint/2010/main" val="2851957111"/>
       </p:ext>
     </p:extLst>
   </p:cSld>
@@ -5584,45 +5640,73 @@
           <a:chExt cx="0" cy="0"/>
         </a:xfrm>
       </p:grpSpPr>
-      <p:sp>
-        <p:nvSpPr>
-          <p:cNvPr id="4" name="Rectangle 3">
+      <p:pic>
+        <p:nvPicPr>
+          <p:cNvPr id="3" name="Picture 2" descr="Diagram&#10;&#10;Description automatically generated">
             <a:extLst>
               <a:ext uri="{FF2B5EF4-FFF2-40B4-BE49-F238E27FC236}">
-                <a16:creationId xmlns:a16="http://schemas.microsoft.com/office/drawing/2014/main" id="{FC29C20F-0B53-4B30-BC01-108971DA8F21}"/>
+                <a16:creationId xmlns:a16="http://schemas.microsoft.com/office/drawing/2014/main" id="{FF30417A-B21F-4F73-A03C-64F607B5D43B}"/>
               </a:ext>
             </a:extLst>
           </p:cNvPr>
-          <p:cNvSpPr/>
+          <p:cNvPicPr>
+            <a:picLocks noChangeAspect="1"/>
+          </p:cNvPicPr>
           <p:nvPr/>
-        </p:nvSpPr>
+        </p:nvPicPr>
+        <p:blipFill>
+          <a:blip r:embed="rId2"/>
+          <a:stretch>
+            <a:fillRect/>
+          </a:stretch>
+        </p:blipFill>
         <p:spPr>
           <a:xfrm>
-            <a:off x="4625217" y="2659559"/>
-            <a:ext cx="2941566" cy="769441"/>
+            <a:off x="3517366" y="1850095"/>
+            <a:ext cx="5157268" cy="4409353"/>
           </a:xfrm>
           <a:prstGeom prst="rect">
             <a:avLst/>
           </a:prstGeom>
         </p:spPr>
-        <p:txBody>
-          <a:bodyPr wrap="square">
-            <a:spAutoFit/>
-          </a:bodyPr>
-          <a:lstStyle/>
-          <a:p>
-            <a:pPr algn="ctr"/>
-            <a:r>
-              <a:rPr lang="en-US" sz="4400" dirty="0"/>
-              <a:t>DEMO APP</a:t>
-            </a:r>
+      </p:pic>
+      <p:sp>
+        <p:nvSpPr>
+          <p:cNvPr id="4" name="Title 3">
+            <a:extLst>
+              <a:ext uri="{FF2B5EF4-FFF2-40B4-BE49-F238E27FC236}">
+                <a16:creationId xmlns:a16="http://schemas.microsoft.com/office/drawing/2014/main" id="{ADE44049-AE6C-4301-BA0A-39B529E10211}"/>
+              </a:ext>
+            </a:extLst>
+          </p:cNvPr>
+          <p:cNvSpPr>
+            <a:spLocks noGrp="1"/>
+          </p:cNvSpPr>
+          <p:nvPr>
+            <p:ph type="title"/>
+          </p:nvPr>
+        </p:nvSpPr>
+        <p:spPr/>
+        <p:txBody>
+          <a:bodyPr/>
+          <a:lstStyle/>
+          <a:p>
+            <a:r>
+              <a:rPr lang="en-US" dirty="0"/>
+              <a:t>Pods </a:t>
+            </a:r>
+            <a:r>
+              <a:rPr lang="en-US"/>
+              <a:t>and Service</a:t>
+            </a:r>
+            <a:endParaRPr lang="en-US" dirty="0"/>
           </a:p>
         </p:txBody>
       </p:sp>
     </p:spTree>
     <p:extLst>
       <p:ext uri="{BB962C8B-B14F-4D97-AF65-F5344CB8AC3E}">
-        <p14:creationId xmlns:p14="http://schemas.microsoft.com/office/powerpoint/2010/main" val="857930531"/>
+        <p14:creationId xmlns:p14="http://schemas.microsoft.com/office/powerpoint/2010/main" val="3785188378"/>
       </p:ext>
     </p:extLst>
   </p:cSld>
@@ -5663,8 +5747,8 @@
         </p:nvSpPr>
         <p:spPr>
           <a:xfrm>
-            <a:off x="1002324" y="1428333"/>
-            <a:ext cx="10045211" cy="3970318"/>
+            <a:off x="4625217" y="2659559"/>
+            <a:ext cx="2941566" cy="769441"/>
           </a:xfrm>
           <a:prstGeom prst="rect">
             <a:avLst/>
@@ -5676,73 +5760,10 @@
           </a:bodyPr>
           <a:lstStyle/>
           <a:p>
-            <a:pPr marL="571500" indent="-571500">
-              <a:buFont typeface="Arial" panose="020B0604020202020204" pitchFamily="34" charset="0"/>
-              <a:buChar char="•"/>
-            </a:pPr>
-            <a:r>
-              <a:rPr lang="en-US" sz="3600" dirty="0"/>
-              <a:t>Pods</a:t>
-            </a:r>
-          </a:p>
-          <a:p>
-            <a:pPr marL="571500" indent="-571500">
-              <a:buFont typeface="Arial" panose="020B0604020202020204" pitchFamily="34" charset="0"/>
-              <a:buChar char="•"/>
-            </a:pPr>
-            <a:r>
-              <a:rPr lang="en-US" sz="3600" dirty="0"/>
-              <a:t>Deployments and Replica set</a:t>
-            </a:r>
-          </a:p>
-          <a:p>
-            <a:pPr marL="571500" indent="-571500">
-              <a:buFont typeface="Arial" panose="020B0604020202020204" pitchFamily="34" charset="0"/>
-              <a:buChar char="•"/>
-            </a:pPr>
-            <a:r>
-              <a:rPr lang="en-US" sz="3600" dirty="0"/>
-              <a:t>Services</a:t>
-            </a:r>
-          </a:p>
-          <a:p>
-            <a:pPr marL="1028700" lvl="1" indent="-571500">
-              <a:buFont typeface="Arial" panose="020B0604020202020204" pitchFamily="34" charset="0"/>
-              <a:buChar char="•"/>
-            </a:pPr>
-            <a:r>
-              <a:rPr lang="en-US" sz="3600" dirty="0"/>
-              <a:t>Liveliness and readiness probe</a:t>
-            </a:r>
-          </a:p>
-          <a:p>
-            <a:pPr marL="1028700" lvl="1" indent="-571500">
-              <a:buFont typeface="Arial" panose="020B0604020202020204" pitchFamily="34" charset="0"/>
-              <a:buChar char="•"/>
-            </a:pPr>
-            <a:r>
-              <a:rPr lang="en-US" sz="3600" dirty="0"/>
-              <a:t>Load balancing</a:t>
-            </a:r>
-          </a:p>
-          <a:p>
-            <a:pPr marL="571500" indent="-571500">
-              <a:buFont typeface="Arial" panose="020B0604020202020204" pitchFamily="34" charset="0"/>
-              <a:buChar char="•"/>
-            </a:pPr>
-            <a:r>
-              <a:rPr lang="en-US" sz="3600" dirty="0"/>
-              <a:t>Config Map and secrets</a:t>
-            </a:r>
-          </a:p>
-          <a:p>
-            <a:pPr marL="571500" indent="-571500">
-              <a:buFont typeface="Arial" panose="020B0604020202020204" pitchFamily="34" charset="0"/>
-              <a:buChar char="•"/>
-            </a:pPr>
-            <a:r>
-              <a:rPr lang="en-US" sz="3600" dirty="0"/>
-              <a:t>Auto scaling and self healing</a:t>
+            <a:pPr algn="ctr"/>
+            <a:r>
+              <a:rPr lang="en-US" sz="4400" dirty="0"/>
+              <a:t>DEMO APP</a:t>
             </a:r>
           </a:p>
         </p:txBody>
@@ -5750,7 +5771,7 @@
     </p:spTree>
     <p:extLst>
       <p:ext uri="{BB962C8B-B14F-4D97-AF65-F5344CB8AC3E}">
-        <p14:creationId xmlns:p14="http://schemas.microsoft.com/office/powerpoint/2010/main" val="359971230"/>
+        <p14:creationId xmlns:p14="http://schemas.microsoft.com/office/powerpoint/2010/main" val="857930531"/>
       </p:ext>
     </p:extLst>
   </p:cSld>

</xml_diff>

<commit_message>
Updated PPT with more details and images
</commit_message>
<xml_diff>
--- a/Understanding_Kubernetes/Kubernetes.pptx
+++ b/Understanding_Kubernetes/Kubernetes.pptx
@@ -12,8 +12,8 @@
     <p:sldId id="263" r:id="rId3"/>
     <p:sldId id="269" r:id="rId4"/>
     <p:sldId id="273" r:id="rId5"/>
-    <p:sldId id="275" r:id="rId6"/>
-    <p:sldId id="276" r:id="rId7"/>
+    <p:sldId id="279" r:id="rId6"/>
+    <p:sldId id="275" r:id="rId7"/>
     <p:sldId id="278" r:id="rId8"/>
     <p:sldId id="267" r:id="rId9"/>
     <p:sldId id="270" r:id="rId10"/>
@@ -241,7 +241,7 @@
           <a:p>
             <a:fld id="{3D489D7F-5E0A-4AB7-9046-90C75797668D}" type="datetimeFigureOut">
               <a:rPr lang="en-US" smtClean="0"/>
-              <a:t>2/22/2021</a:t>
+              <a:t>2/23/2021</a:t>
             </a:fld>
             <a:endParaRPr lang="en-US" dirty="0"/>
           </a:p>
@@ -1176,7 +1176,7 @@
           <a:p>
             <a:fld id="{4BDF68E2-58F2-4D09-BE8B-E3BD06533059}" type="datetimeFigureOut">
               <a:rPr lang="en-US" dirty="0"/>
-              <a:t>2/22/2021</a:t>
+              <a:t>2/23/2021</a:t>
             </a:fld>
             <a:endParaRPr lang="en-US" dirty="0"/>
           </a:p>
@@ -1379,7 +1379,7 @@
           <a:p>
             <a:fld id="{2E2D6473-DF6D-4702-B328-E0DD40540A4E}" type="datetimeFigureOut">
               <a:rPr lang="en-US" dirty="0"/>
-              <a:t>2/22/2021</a:t>
+              <a:t>2/23/2021</a:t>
             </a:fld>
             <a:endParaRPr lang="en-US" dirty="0"/>
           </a:p>
@@ -1630,7 +1630,7 @@
           <a:p>
             <a:fld id="{E26F7E3A-B166-407D-9866-32884E7D5B37}" type="datetimeFigureOut">
               <a:rPr lang="en-US" dirty="0"/>
-              <a:t>2/22/2021</a:t>
+              <a:t>2/23/2021</a:t>
             </a:fld>
             <a:endParaRPr lang="en-US" dirty="0"/>
           </a:p>
@@ -1898,7 +1898,7 @@
           <a:p>
             <a:fld id="{528FC5F6-F338-4AE4-BB23-26385BCFC423}" type="datetimeFigureOut">
               <a:rPr lang="en-US" dirty="0"/>
-              <a:t>2/22/2021</a:t>
+              <a:t>2/23/2021</a:t>
             </a:fld>
             <a:endParaRPr lang="en-US" dirty="0"/>
           </a:p>
@@ -2236,7 +2236,7 @@
           <a:p>
             <a:fld id="{20EBB0C4-6273-4C6E-B9BD-2EDC30F1CD52}" type="datetimeFigureOut">
               <a:rPr lang="en-US" dirty="0"/>
-              <a:t>2/22/2021</a:t>
+              <a:t>2/23/2021</a:t>
             </a:fld>
             <a:endParaRPr lang="en-US" dirty="0"/>
           </a:p>
@@ -2506,7 +2506,7 @@
           <a:p>
             <a:fld id="{19AB4D41-86C1-4908-B66A-0B50CEB3BF29}" type="datetimeFigureOut">
               <a:rPr lang="en-US" dirty="0"/>
-              <a:t>2/22/2021</a:t>
+              <a:t>2/23/2021</a:t>
             </a:fld>
             <a:endParaRPr lang="en-US" dirty="0"/>
           </a:p>
@@ -2880,7 +2880,7 @@
           <a:p>
             <a:fld id="{E6426E2C-56C1-4E0D-A793-0088A7FDD37E}" type="datetimeFigureOut">
               <a:rPr lang="en-US" dirty="0"/>
-              <a:t>2/22/2021</a:t>
+              <a:t>2/23/2021</a:t>
             </a:fld>
             <a:endParaRPr lang="en-US" dirty="0"/>
           </a:p>
@@ -2993,7 +2993,7 @@
           <a:p>
             <a:fld id="{C8C39B41-D8B5-4052-B551-9B5525EAA8B6}" type="datetimeFigureOut">
               <a:rPr lang="en-US" dirty="0"/>
-              <a:t>2/22/2021</a:t>
+              <a:t>2/23/2021</a:t>
             </a:fld>
             <a:endParaRPr lang="en-US" dirty="0"/>
           </a:p>
@@ -3159,7 +3159,7 @@
           <a:p>
             <a:fld id="{4D94136C-8742-45B2-AF27-D93DF72833A9}" type="datetimeFigureOut">
               <a:rPr lang="en-US" dirty="0"/>
-              <a:t>2/22/2021</a:t>
+              <a:t>2/23/2021</a:t>
             </a:fld>
             <a:endParaRPr lang="en-US" dirty="0"/>
           </a:p>
@@ -3509,7 +3509,7 @@
           <a:p>
             <a:fld id="{32ABBEA6-7C60-4B02-AE87-00D78D8422AF}" type="datetimeFigureOut">
               <a:rPr lang="en-US" dirty="0"/>
-              <a:t>2/22/2021</a:t>
+              <a:t>2/23/2021</a:t>
             </a:fld>
             <a:endParaRPr lang="en-US" dirty="0"/>
           </a:p>
@@ -3886,7 +3886,7 @@
           <a:p>
             <a:fld id="{C9CAD897-D46E-4AD2-BD9B-49DD3E640873}" type="datetimeFigureOut">
               <a:rPr lang="en-US" dirty="0"/>
-              <a:t>2/22/2021</a:t>
+              <a:t>2/23/2021</a:t>
             </a:fld>
             <a:endParaRPr lang="en-US" dirty="0"/>
           </a:p>
@@ -4168,7 +4168,7 @@
           <a:p>
             <a:fld id="{98624D31-43A5-475A-80CF-332C9F6DCF35}" type="datetimeFigureOut">
               <a:rPr lang="en-US" dirty="0"/>
-              <a:t>2/22/2021</a:t>
+              <a:t>2/23/2021</a:t>
             </a:fld>
             <a:endParaRPr lang="en-US" dirty="0"/>
           </a:p>
@@ -5110,7 +5110,9 @@
           </a:xfrm>
         </p:spPr>
         <p:txBody>
-          <a:bodyPr/>
+          <a:bodyPr>
+            <a:normAutofit lnSpcReduction="10000"/>
+          </a:bodyPr>
           <a:lstStyle/>
           <a:p>
             <a:pPr marL="544068" lvl="1" indent="-342900">
@@ -5119,7 +5121,7 @@
             </a:pPr>
             <a:r>
               <a:rPr lang="en-US" dirty="0"/>
-              <a:t>What is Kubernetes and Its Architecture?</a:t>
+              <a:t>What is Kubernetes?</a:t>
             </a:r>
           </a:p>
           <a:p>
@@ -5131,22 +5133,10 @@
               <a:rPr lang="en-US" dirty="0"/>
               <a:t>Automatic deployment, Scaling , Management of containerized application.</a:t>
             </a:r>
-          </a:p>
-          <a:p>
-            <a:pPr marL="726948" lvl="2" indent="-342900">
-              <a:buFont typeface="+mj-lt"/>
-              <a:buAutoNum type="arabicPeriod"/>
-            </a:pPr>
-            <a:r>
-              <a:rPr lang="en-US" b="0" i="0" dirty="0">
-                <a:solidFill>
-                  <a:srgbClr val="222222"/>
-                </a:solidFill>
-                <a:effectLst/>
-                <a:latin typeface="open sans"/>
-              </a:rPr>
-              <a:t>Terminology.</a:t>
-            </a:r>
+            <a:br>
+              <a:rPr lang="en-US" dirty="0"/>
+            </a:br>
+            <a:endParaRPr lang="en-US" dirty="0"/>
           </a:p>
           <a:p>
             <a:pPr marL="544068" lvl="1" indent="-342900">
@@ -5160,9 +5150,22 @@
                 </a:solidFill>
                 <a:latin typeface="open sans"/>
               </a:rPr>
-              <a:t>Why</a:t>
-            </a:r>
-            <a:endParaRPr lang="en-US" dirty="0"/>
+              <a:t>Terminology</a:t>
+            </a:r>
+            <a:br>
+              <a:rPr lang="en-US" dirty="0">
+                <a:solidFill>
+                  <a:srgbClr val="222222"/>
+                </a:solidFill>
+                <a:latin typeface="open sans"/>
+              </a:rPr>
+            </a:br>
+            <a:endParaRPr lang="en-US" dirty="0">
+              <a:solidFill>
+                <a:srgbClr val="222222"/>
+              </a:solidFill>
+              <a:latin typeface="open sans"/>
+            </a:endParaRPr>
           </a:p>
           <a:p>
             <a:pPr marL="544068" lvl="1" indent="-342900">
@@ -5170,6 +5173,30 @@
               <a:buAutoNum type="arabicPeriod"/>
             </a:pPr>
             <a:r>
+              <a:rPr lang="en-US" dirty="0">
+                <a:solidFill>
+                  <a:srgbClr val="222222"/>
+                </a:solidFill>
+                <a:latin typeface="open sans"/>
+              </a:rPr>
+              <a:t>Why we need Kubernetes and its components.</a:t>
+            </a:r>
+            <a:br>
+              <a:rPr lang="en-US" dirty="0">
+                <a:solidFill>
+                  <a:srgbClr val="222222"/>
+                </a:solidFill>
+                <a:latin typeface="open sans"/>
+              </a:rPr>
+            </a:br>
+            <a:endParaRPr lang="en-US" dirty="0"/>
+          </a:p>
+          <a:p>
+            <a:pPr marL="544068" lvl="1" indent="-342900">
+              <a:buFont typeface="+mj-lt"/>
+              <a:buAutoNum type="arabicPeriod"/>
+            </a:pPr>
+            <a:r>
               <a:rPr lang="en-US" dirty="0"/>
               <a:t>Walkthrough of a demo app and setting up of local environment.</a:t>
             </a:r>
@@ -5193,6 +5220,10 @@
               <a:rPr lang="en-US" dirty="0"/>
               <a:t>Running a docker container on local machine also via Kubernetes.</a:t>
             </a:r>
+            <a:br>
+              <a:rPr lang="en-US" dirty="0"/>
+            </a:br>
+            <a:endParaRPr lang="en-US" dirty="0"/>
           </a:p>
           <a:p>
             <a:pPr marL="544068" lvl="1" indent="-342900">
@@ -5213,6 +5244,10 @@
               <a:rPr lang="en-US" dirty="0"/>
               <a:t>Demonstration of Pod, Services, Replica set, Deployments, probes and Config maps and secrets.</a:t>
             </a:r>
+            <a:br>
+              <a:rPr lang="en-US" dirty="0"/>
+            </a:br>
+            <a:endParaRPr lang="en-US" dirty="0"/>
           </a:p>
           <a:p>
             <a:pPr marL="544068" lvl="1" indent="-342900">
@@ -5221,17 +5256,7 @@
             </a:pPr>
             <a:r>
               <a:rPr lang="en-US" dirty="0"/>
-              <a:t>References.</a:t>
-            </a:r>
-          </a:p>
-          <a:p>
-            <a:pPr marL="544068" lvl="1" indent="-342900">
-              <a:buFont typeface="+mj-lt"/>
-              <a:buAutoNum type="arabicPeriod"/>
-            </a:pPr>
-            <a:r>
-              <a:rPr lang="en-US" dirty="0"/>
-              <a:t>Summary and QA.</a:t>
+              <a:t>References, Summary and QA.</a:t>
             </a:r>
           </a:p>
           <a:p>
@@ -5370,7 +5395,7 @@
           <a:p>
             <a:r>
               <a:rPr lang="en-US" dirty="0"/>
-              <a:t>Terminology</a:t>
+              <a:t>Terminology ( K8s objects )</a:t>
             </a:r>
           </a:p>
         </p:txBody>
@@ -5391,10 +5416,15 @@
             <p:ph idx="1"/>
           </p:nvPr>
         </p:nvSpPr>
-        <p:spPr/>
+        <p:spPr>
+          <a:xfrm>
+            <a:off x="1097280" y="2241388"/>
+            <a:ext cx="4934243" cy="3187862"/>
+          </a:xfrm>
+        </p:spPr>
         <p:txBody>
           <a:bodyPr>
-            <a:normAutofit fontScale="92500" lnSpcReduction="20000"/>
+            <a:normAutofit/>
           </a:bodyPr>
           <a:lstStyle/>
           <a:p>
@@ -5403,38 +5433,18 @@
               <a:buChar char="•"/>
             </a:pPr>
             <a:r>
-              <a:rPr lang="en-US" sz="3600" dirty="0"/>
-              <a:t>Node</a:t>
-            </a:r>
-          </a:p>
-          <a:p>
-            <a:pPr marL="1028700" lvl="1" indent="-571500">
+              <a:rPr lang="en-US" sz="1800" dirty="0"/>
+              <a:t>Pod</a:t>
+            </a:r>
+          </a:p>
+          <a:p>
+            <a:pPr marL="864108" lvl="1" indent="-571500">
               <a:buFont typeface="Arial" panose="020B0604020202020204" pitchFamily="34" charset="0"/>
               <a:buChar char="•"/>
             </a:pPr>
             <a:r>
-              <a:rPr lang="en-US" sz="3600" dirty="0"/>
-              <a:t>Pods</a:t>
-            </a:r>
-          </a:p>
-          <a:p>
-            <a:pPr marL="1485900" lvl="2" indent="-571500">
-              <a:buFont typeface="Arial" panose="020B0604020202020204" pitchFamily="34" charset="0"/>
-              <a:buChar char="•"/>
-            </a:pPr>
-            <a:r>
-              <a:rPr lang="en-US" sz="3600" dirty="0"/>
-              <a:t>Containers</a:t>
-            </a:r>
-          </a:p>
-          <a:p>
-            <a:pPr marL="1943100" lvl="3" indent="-571500">
-              <a:buFont typeface="Arial" panose="020B0604020202020204" pitchFamily="34" charset="0"/>
-              <a:buChar char="•"/>
-            </a:pPr>
-            <a:r>
-              <a:rPr lang="en-US" sz="3600" dirty="0"/>
-              <a:t>Liveliness and readiness probe</a:t>
+              <a:rPr lang="en-US" sz="1600" dirty="0"/>
+              <a:t>Container</a:t>
             </a:r>
           </a:p>
           <a:p>
@@ -5443,7 +5453,27 @@
               <a:buChar char="•"/>
             </a:pPr>
             <a:r>
-              <a:rPr lang="en-US" sz="3600" dirty="0"/>
+              <a:rPr lang="en-US" dirty="0"/>
+              <a:t>Node</a:t>
+            </a:r>
+          </a:p>
+          <a:p>
+            <a:pPr marL="571500" indent="-571500">
+              <a:buFont typeface="Arial" panose="020B0604020202020204" pitchFamily="34" charset="0"/>
+              <a:buChar char="•"/>
+            </a:pPr>
+            <a:r>
+              <a:rPr lang="en-US" dirty="0"/>
+              <a:t>Services and Load balancing </a:t>
+            </a:r>
+          </a:p>
+          <a:p>
+            <a:pPr marL="571500" indent="-571500">
+              <a:buFont typeface="Arial" panose="020B0604020202020204" pitchFamily="34" charset="0"/>
+              <a:buChar char="•"/>
+            </a:pPr>
+            <a:r>
+              <a:rPr lang="en-US" sz="1800" dirty="0"/>
               <a:t>Deployments and Replica set.</a:t>
             </a:r>
           </a:p>
@@ -5453,7 +5483,7 @@
               <a:buChar char="•"/>
             </a:pPr>
             <a:r>
-              <a:rPr lang="en-US" sz="3600" dirty="0"/>
+              <a:rPr lang="en-US" dirty="0"/>
               <a:t>Auto scaling and self healing.</a:t>
             </a:r>
           </a:p>
@@ -5463,22 +5493,42 @@
               <a:buChar char="•"/>
             </a:pPr>
             <a:r>
-              <a:rPr lang="en-US" sz="3600" dirty="0"/>
-              <a:t>Services and Load balancing</a:t>
-            </a:r>
-          </a:p>
-          <a:p>
-            <a:pPr marL="571500" indent="-571500">
-              <a:buFont typeface="Arial" panose="020B0604020202020204" pitchFamily="34" charset="0"/>
-              <a:buChar char="•"/>
-            </a:pPr>
-            <a:r>
-              <a:rPr lang="en-US" sz="3600" dirty="0"/>
+              <a:rPr lang="en-US" sz="1800" dirty="0"/>
               <a:t>Config Map and secrets</a:t>
             </a:r>
           </a:p>
         </p:txBody>
       </p:sp>
+      <p:pic>
+        <p:nvPicPr>
+          <p:cNvPr id="3" name="Picture 2" descr="A picture containing timeline&#10;&#10;Description automatically generated">
+            <a:extLst>
+              <a:ext uri="{FF2B5EF4-FFF2-40B4-BE49-F238E27FC236}">
+                <a16:creationId xmlns:a16="http://schemas.microsoft.com/office/drawing/2014/main" id="{D2588360-AEAD-42BC-96BE-A971B38F998A}"/>
+              </a:ext>
+            </a:extLst>
+          </p:cNvPr>
+          <p:cNvPicPr>
+            <a:picLocks noChangeAspect="1"/>
+          </p:cNvPicPr>
+          <p:nvPr/>
+        </p:nvPicPr>
+        <p:blipFill>
+          <a:blip r:embed="rId3"/>
+          <a:stretch>
+            <a:fillRect/>
+          </a:stretch>
+        </p:blipFill>
+        <p:spPr>
+          <a:xfrm>
+            <a:off x="5983783" y="2241388"/>
+            <a:ext cx="6299491" cy="3187861"/>
+          </a:xfrm>
+          <a:prstGeom prst="rect">
+            <a:avLst/>
+          </a:prstGeom>
+        </p:spPr>
+      </p:pic>
     </p:spTree>
     <p:extLst>
       <p:ext uri="{BB962C8B-B14F-4D97-AF65-F5344CB8AC3E}">
@@ -5493,6 +5543,166 @@
 </file>
 
 <file path=ppt/slides/slide5.xml><?xml version="1.0" encoding="utf-8"?>
+<p:sld xmlns:a="http://schemas.openxmlformats.org/drawingml/2006/main" xmlns:r="http://schemas.openxmlformats.org/officeDocument/2006/relationships" xmlns:p="http://schemas.openxmlformats.org/presentationml/2006/main">
+  <p:cSld>
+    <p:spTree>
+      <p:nvGrpSpPr>
+        <p:cNvPr id="1" name=""/>
+        <p:cNvGrpSpPr/>
+        <p:nvPr/>
+      </p:nvGrpSpPr>
+      <p:grpSpPr>
+        <a:xfrm>
+          <a:off x="0" y="0"/>
+          <a:ext cx="0" cy="0"/>
+          <a:chOff x="0" y="0"/>
+          <a:chExt cx="0" cy="0"/>
+        </a:xfrm>
+      </p:grpSpPr>
+      <p:sp>
+        <p:nvSpPr>
+          <p:cNvPr id="2" name="Title 1">
+            <a:extLst>
+              <a:ext uri="{FF2B5EF4-FFF2-40B4-BE49-F238E27FC236}">
+                <a16:creationId xmlns:a16="http://schemas.microsoft.com/office/drawing/2014/main" id="{5A07E68D-5979-4ED7-B6F4-CD78759187DF}"/>
+              </a:ext>
+            </a:extLst>
+          </p:cNvPr>
+          <p:cNvSpPr>
+            <a:spLocks noGrp="1"/>
+          </p:cNvSpPr>
+          <p:nvPr>
+            <p:ph type="title"/>
+          </p:nvPr>
+        </p:nvSpPr>
+        <p:spPr/>
+        <p:txBody>
+          <a:bodyPr/>
+          <a:lstStyle/>
+          <a:p>
+            <a:r>
+              <a:rPr lang="en-US" b="0" i="0" dirty="0">
+                <a:solidFill>
+                  <a:srgbClr val="222222"/>
+                </a:solidFill>
+                <a:effectLst/>
+                <a:latin typeface="open sans"/>
+              </a:rPr>
+              <a:t>Why we need Kubernetes</a:t>
+            </a:r>
+            <a:endParaRPr lang="en-US" dirty="0"/>
+          </a:p>
+        </p:txBody>
+      </p:sp>
+      <p:sp>
+        <p:nvSpPr>
+          <p:cNvPr id="3" name="Content Placeholder 2">
+            <a:extLst>
+              <a:ext uri="{FF2B5EF4-FFF2-40B4-BE49-F238E27FC236}">
+                <a16:creationId xmlns:a16="http://schemas.microsoft.com/office/drawing/2014/main" id="{5FB66880-BE46-45A8-84B8-C07936755EBF}"/>
+              </a:ext>
+            </a:extLst>
+          </p:cNvPr>
+          <p:cNvSpPr>
+            <a:spLocks noGrp="1"/>
+          </p:cNvSpPr>
+          <p:nvPr>
+            <p:ph idx="1"/>
+          </p:nvPr>
+        </p:nvSpPr>
+        <p:spPr>
+          <a:xfrm>
+            <a:off x="1066800" y="2223804"/>
+            <a:ext cx="10058400" cy="2603174"/>
+          </a:xfrm>
+        </p:spPr>
+        <p:txBody>
+          <a:bodyPr>
+            <a:normAutofit/>
+          </a:bodyPr>
+          <a:lstStyle/>
+          <a:p>
+            <a:pPr marL="571500" indent="-571500">
+              <a:buFont typeface="Arial" panose="020B0604020202020204" pitchFamily="34" charset="0"/>
+              <a:buChar char="•"/>
+            </a:pPr>
+            <a:r>
+              <a:rPr lang="en-US" sz="1800" dirty="0"/>
+              <a:t>Service discovery and load balancing</a:t>
+            </a:r>
+          </a:p>
+          <a:p>
+            <a:pPr marL="571500" indent="-571500">
+              <a:buFont typeface="Arial" panose="020B0604020202020204" pitchFamily="34" charset="0"/>
+              <a:buChar char="•"/>
+            </a:pPr>
+            <a:r>
+              <a:rPr lang="en-US" sz="1800" dirty="0"/>
+              <a:t>Storage orchestration</a:t>
+            </a:r>
+          </a:p>
+          <a:p>
+            <a:pPr marL="571500" indent="-571500">
+              <a:buFont typeface="Arial" panose="020B0604020202020204" pitchFamily="34" charset="0"/>
+              <a:buChar char="•"/>
+            </a:pPr>
+            <a:r>
+              <a:rPr lang="en-US" sz="1800" dirty="0"/>
+              <a:t>Automated rollouts and rollbacks</a:t>
+            </a:r>
+          </a:p>
+          <a:p>
+            <a:pPr marL="571500" indent="-571500">
+              <a:buFont typeface="Arial" panose="020B0604020202020204" pitchFamily="34" charset="0"/>
+              <a:buChar char="•"/>
+            </a:pPr>
+            <a:r>
+              <a:rPr lang="en-US" sz="1800" dirty="0"/>
+              <a:t>Automatic bin packing</a:t>
+            </a:r>
+          </a:p>
+          <a:p>
+            <a:pPr marL="571500" indent="-571500">
+              <a:buFont typeface="Arial" panose="020B0604020202020204" pitchFamily="34" charset="0"/>
+              <a:buChar char="•"/>
+            </a:pPr>
+            <a:r>
+              <a:rPr lang="en-US" sz="1800" dirty="0"/>
+              <a:t>Self-healing</a:t>
+            </a:r>
+          </a:p>
+          <a:p>
+            <a:pPr marL="571500" indent="-571500">
+              <a:buFont typeface="Arial" panose="020B0604020202020204" pitchFamily="34" charset="0"/>
+              <a:buChar char="•"/>
+            </a:pPr>
+            <a:r>
+              <a:rPr lang="en-US" sz="1800" dirty="0"/>
+              <a:t>Secret and configuration management</a:t>
+            </a:r>
+          </a:p>
+          <a:p>
+            <a:pPr marL="0" indent="0">
+              <a:buNone/>
+            </a:pPr>
+            <a:endParaRPr lang="en-US" dirty="0"/>
+          </a:p>
+        </p:txBody>
+      </p:sp>
+    </p:spTree>
+    <p:extLst>
+      <p:ext uri="{BB962C8B-B14F-4D97-AF65-F5344CB8AC3E}">
+        <p14:creationId xmlns:p14="http://schemas.microsoft.com/office/powerpoint/2010/main" val="3162303114"/>
+      </p:ext>
+    </p:extLst>
+  </p:cSld>
+  <p:clrMapOvr>
+    <a:masterClrMapping/>
+  </p:clrMapOvr>
+</p:sld>
+</file>
+
+<file path=ppt/slides/slide6.xml><?xml version="1.0" encoding="utf-8"?>
 <p:sld xmlns:a="http://schemas.openxmlformats.org/drawingml/2006/main" xmlns:r="http://schemas.openxmlformats.org/officeDocument/2006/relationships" xmlns:p="http://schemas.openxmlformats.org/presentationml/2006/main">
   <p:cSld>
     <p:spTree>
@@ -5549,66 +5759,6 @@
     <p:extLst>
       <p:ext uri="{BB962C8B-B14F-4D97-AF65-F5344CB8AC3E}">
         <p14:creationId xmlns:p14="http://schemas.microsoft.com/office/powerpoint/2010/main" val="3066455301"/>
-      </p:ext>
-    </p:extLst>
-  </p:cSld>
-  <p:clrMapOvr>
-    <a:masterClrMapping/>
-  </p:clrMapOvr>
-</p:sld>
-</file>
-
-<file path=ppt/slides/slide6.xml><?xml version="1.0" encoding="utf-8"?>
-<p:sld xmlns:a="http://schemas.openxmlformats.org/drawingml/2006/main" xmlns:r="http://schemas.openxmlformats.org/officeDocument/2006/relationships" xmlns:p="http://schemas.openxmlformats.org/presentationml/2006/main">
-  <p:cSld>
-    <p:spTree>
-      <p:nvGrpSpPr>
-        <p:cNvPr id="1" name=""/>
-        <p:cNvGrpSpPr/>
-        <p:nvPr/>
-      </p:nvGrpSpPr>
-      <p:grpSpPr>
-        <a:xfrm>
-          <a:off x="0" y="0"/>
-          <a:ext cx="0" cy="0"/>
-          <a:chOff x="0" y="0"/>
-          <a:chExt cx="0" cy="0"/>
-        </a:xfrm>
-      </p:grpSpPr>
-      <p:pic>
-        <p:nvPicPr>
-          <p:cNvPr id="5" name="Picture 4" descr="Diagram&#10;&#10;Description automatically generated">
-            <a:extLst>
-              <a:ext uri="{FF2B5EF4-FFF2-40B4-BE49-F238E27FC236}">
-                <a16:creationId xmlns:a16="http://schemas.microsoft.com/office/drawing/2014/main" id="{0A313722-1DB2-408C-A5A2-95E6C69022ED}"/>
-              </a:ext>
-            </a:extLst>
-          </p:cNvPr>
-          <p:cNvPicPr>
-            <a:picLocks noChangeAspect="1"/>
-          </p:cNvPicPr>
-          <p:nvPr/>
-        </p:nvPicPr>
-        <p:blipFill>
-          <a:blip r:embed="rId2"/>
-          <a:stretch>
-            <a:fillRect/>
-          </a:stretch>
-        </p:blipFill>
-        <p:spPr>
-          <a:xfrm>
-            <a:off x="347845" y="526715"/>
-            <a:ext cx="11496309" cy="5804570"/>
-          </a:xfrm>
-          <a:prstGeom prst="rect">
-            <a:avLst/>
-          </a:prstGeom>
-        </p:spPr>
-      </p:pic>
-    </p:spTree>
-    <p:extLst>
-      <p:ext uri="{BB962C8B-B14F-4D97-AF65-F5344CB8AC3E}">
-        <p14:creationId xmlns:p14="http://schemas.microsoft.com/office/powerpoint/2010/main" val="2851957111"/>
       </p:ext>
     </p:extLst>
   </p:cSld>
@@ -5688,13 +5838,8 @@
           <a:p>
             <a:r>
               <a:rPr lang="en-US" dirty="0"/>
-              <a:t>Pods </a:t>
-            </a:r>
-            <a:r>
-              <a:rPr lang="en-US"/>
-              <a:t>and Service</a:t>
-            </a:r>
-            <a:endParaRPr lang="en-US" dirty="0"/>
+              <a:t>Pods and Service</a:t>
+            </a:r>
           </a:p>
         </p:txBody>
       </p:sp>

</xml_diff>